<commit_message>
add example employee upload csv and updated presentations
</commit_message>
<xml_diff>
--- a/CS347 PROJECT PRESENTATION.pptx
+++ b/CS347 PROJECT PRESENTATION.pptx
@@ -5023,7 +5023,7 @@
             </a:br>
           </a:p>
           <a:p>
-            <a:pPr indent="-317500" lvl="0" marL="457200">
+            <a:pPr indent="-317500" lvl="0" marL="457200" rtl="0">
               <a:spcBef>
                 <a:spcPts val="0"/>
               </a:spcBef>
@@ -5037,6 +5037,66 @@
             <a:r>
               <a:rPr lang="en" sz="1400"/>
               <a:t>MINOR: Cloning memberships doesn’t filter out already existing memberships so you can get duplicate memberships</a:t>
+            </a:r>
+            <a:br>
+              <a:rPr lang="en" sz="1400"/>
+            </a:br>
+          </a:p>
+          <a:p>
+            <a:pPr indent="-317500" lvl="0" marL="457200" rtl="0">
+              <a:spcBef>
+                <a:spcPts val="0"/>
+              </a:spcBef>
+              <a:buClr>
+                <a:schemeClr val="dk2"/>
+              </a:buClr>
+              <a:buSzPct val="100000"/>
+              <a:buFont typeface="Arial"/>
+              <a:buChar char="●"/>
+            </a:pPr>
+            <a:r>
+              <a:rPr lang="en" sz="1400"/>
+              <a:t>MINOR: Region display selector does not properly draw column names for all tabs when SHOW_ALL option is turned off.  It will only show column names for the currently selected tab</a:t>
+            </a:r>
+            <a:br>
+              <a:rPr lang="en" sz="1400"/>
+            </a:br>
+          </a:p>
+          <a:p>
+            <a:pPr indent="-317500" lvl="0" marL="457200" rtl="0">
+              <a:spcBef>
+                <a:spcPts val="0"/>
+              </a:spcBef>
+              <a:buClr>
+                <a:schemeClr val="dk2"/>
+              </a:buClr>
+              <a:buSzPct val="100000"/>
+              <a:buFont typeface="Arial"/>
+              <a:buChar char="●"/>
+            </a:pPr>
+            <a:r>
+              <a:rPr lang="en" sz="1400"/>
+              <a:t>MINOR: Tree control is ‘legacy’ and doesn’t support cascading LOVs.  The only way to update it is to submit the page.</a:t>
+            </a:r>
+            <a:br>
+              <a:rPr lang="en" sz="1400"/>
+            </a:br>
+          </a:p>
+          <a:p>
+            <a:pPr indent="-317500" lvl="0" marL="457200">
+              <a:spcBef>
+                <a:spcPts val="0"/>
+              </a:spcBef>
+              <a:buClr>
+                <a:schemeClr val="dk2"/>
+              </a:buClr>
+              <a:buSzPct val="100000"/>
+              <a:buFont typeface="Arial"/>
+              <a:buChar char="●"/>
+            </a:pPr>
+            <a:r>
+              <a:rPr lang="en" sz="1400"/>
+              <a:t>MAJOR: Cascading LOVs can’t reliably update the shuttle because the shuttle requires a secondary process to sort members into the right and left hand sides.</a:t>
             </a:r>
           </a:p>
         </p:txBody>
@@ -6934,283 +6994,6 @@
 </file>
 
 <file path=ppt/theme/theme1.xml><?xml version="1.0" encoding="utf-8"?>
-<a:theme xmlns:a="http://schemas.openxmlformats.org/drawingml/2006/main" xmlns:r="http://schemas.openxmlformats.org/officeDocument/2006/relationships" name="khaki">
-  <a:themeElements>
-    <a:clrScheme name="Custom 349">
-      <a:dk1>
-        <a:srgbClr val="262626"/>
-      </a:dk1>
-      <a:lt1>
-        <a:srgbClr val="E6D6BD"/>
-      </a:lt1>
-      <a:dk2>
-        <a:srgbClr val="535353"/>
-      </a:dk2>
-      <a:lt2>
-        <a:srgbClr val="B4AD9E"/>
-      </a:lt2>
-      <a:accent1>
-        <a:srgbClr val="ADB48E"/>
-      </a:accent1>
-      <a:accent2>
-        <a:srgbClr val="867961"/>
-      </a:accent2>
-      <a:accent3>
-        <a:srgbClr val="CBB680"/>
-      </a:accent3>
-      <a:accent4>
-        <a:srgbClr val="78A3C0"/>
-      </a:accent4>
-      <a:accent5>
-        <a:srgbClr val="C0AE91"/>
-      </a:accent5>
-      <a:accent6>
-        <a:srgbClr val="668874"/>
-      </a:accent6>
-      <a:hlink>
-        <a:srgbClr val="4B94B3"/>
-      </a:hlink>
-      <a:folHlink>
-        <a:srgbClr val="414141"/>
-      </a:folHlink>
-    </a:clrScheme>
-    <a:fontScheme name="Office">
-      <a:majorFont>
-        <a:latin typeface="Arial"/>
-        <a:ea typeface=""/>
-        <a:cs typeface=""/>
-        <a:font script="Jpan" typeface="ＭＳ Ｐゴシック"/>
-        <a:font script="Hang" typeface="맑은 고딕"/>
-        <a:font script="Hans" typeface="宋体"/>
-        <a:font script="Hant" typeface="新細明體"/>
-        <a:font script="Arab" typeface="Times New Roman"/>
-        <a:font script="Hebr" typeface="Times New Roman"/>
-        <a:font script="Thai" typeface="Angsana New"/>
-        <a:font script="Ethi" typeface="Nyala"/>
-        <a:font script="Beng" typeface="Vrinda"/>
-        <a:font script="Gujr" typeface="Shruti"/>
-        <a:font script="Khmr" typeface="MoolBoran"/>
-        <a:font script="Knda" typeface="Tunga"/>
-        <a:font script="Guru" typeface="Raavi"/>
-        <a:font script="Cans" typeface="Euphemia"/>
-        <a:font script="Cher" typeface="Plantagenet Cherokee"/>
-        <a:font script="Yiii" typeface="Microsoft Yi Baiti"/>
-        <a:font script="Tibt" typeface="Microsoft Himalaya"/>
-        <a:font script="Thaa" typeface="MV Boli"/>
-        <a:font script="Deva" typeface="Mangal"/>
-        <a:font script="Telu" typeface="Gautami"/>
-        <a:font script="Taml" typeface="Latha"/>
-        <a:font script="Syrc" typeface="Estrangelo Edessa"/>
-        <a:font script="Orya" typeface="Kalinga"/>
-        <a:font script="Mlym" typeface="Kartika"/>
-        <a:font script="Laoo" typeface="DokChampa"/>
-        <a:font script="Sinh" typeface="Iskoola Pota"/>
-        <a:font script="Mong" typeface="Mongolian Baiti"/>
-        <a:font script="Viet" typeface="Times New Roman"/>
-        <a:font script="Uigh" typeface="Microsoft Uighur"/>
-      </a:majorFont>
-      <a:minorFont>
-        <a:latin typeface="Arial"/>
-        <a:ea typeface=""/>
-        <a:cs typeface=""/>
-        <a:font script="Jpan" typeface="ＭＳ Ｐゴシック"/>
-        <a:font script="Hang" typeface="맑은 고딕"/>
-        <a:font script="Hans" typeface="宋体"/>
-        <a:font script="Hant" typeface="新細明體"/>
-        <a:font script="Arab" typeface="Times New Roman"/>
-        <a:font script="Hebr" typeface="Times New Roman"/>
-        <a:font script="Thai" typeface="Angsana New"/>
-        <a:font script="Ethi" typeface="Nyala"/>
-        <a:font script="Beng" typeface="Vrinda"/>
-        <a:font script="Gujr" typeface="Shruti"/>
-        <a:font script="Khmr" typeface="MoolBoran"/>
-        <a:font script="Knda" typeface="Tunga"/>
-        <a:font script="Guru" typeface="Raavi"/>
-        <a:font script="Cans" typeface="Euphemia"/>
-        <a:font script="Cher" typeface="Plantagenet Cherokee"/>
-        <a:font script="Yiii" typeface="Microsoft Yi Baiti"/>
-        <a:font script="Tibt" typeface="Microsoft Himalaya"/>
-        <a:font script="Thaa" typeface="MV Boli"/>
-        <a:font script="Deva" typeface="Mangal"/>
-        <a:font script="Telu" typeface="Gautami"/>
-        <a:font script="Taml" typeface="Latha"/>
-        <a:font script="Syrc" typeface="Estrangelo Edessa"/>
-        <a:font script="Orya" typeface="Kalinga"/>
-        <a:font script="Mlym" typeface="Kartika"/>
-        <a:font script="Laoo" typeface="DokChampa"/>
-        <a:font script="Sinh" typeface="Iskoola Pota"/>
-        <a:font script="Mong" typeface="Mongolian Baiti"/>
-        <a:font script="Viet" typeface="Times New Roman"/>
-        <a:font script="Uigh" typeface="Microsoft Uighur"/>
-      </a:minorFont>
-    </a:fontScheme>
-    <a:fmtScheme name="Office">
-      <a:fillStyleLst>
-        <a:solidFill>
-          <a:schemeClr val="phClr"/>
-        </a:solidFill>
-        <a:gradFill rotWithShape="1">
-          <a:gsLst>
-            <a:gs pos="0">
-              <a:schemeClr val="phClr">
-                <a:tint val="50000"/>
-                <a:satMod val="300000"/>
-              </a:schemeClr>
-            </a:gs>
-            <a:gs pos="35000">
-              <a:schemeClr val="phClr">
-                <a:tint val="37000"/>
-                <a:satMod val="300000"/>
-              </a:schemeClr>
-            </a:gs>
-            <a:gs pos="100000">
-              <a:schemeClr val="phClr">
-                <a:tint val="15000"/>
-                <a:satMod val="350000"/>
-              </a:schemeClr>
-            </a:gs>
-          </a:gsLst>
-          <a:lin ang="16200000" scaled="1"/>
-        </a:gradFill>
-        <a:gradFill rotWithShape="1">
-          <a:gsLst>
-            <a:gs pos="0">
-              <a:schemeClr val="phClr">
-                <a:tint val="100000"/>
-                <a:shade val="100000"/>
-                <a:satMod val="130000"/>
-              </a:schemeClr>
-            </a:gs>
-            <a:gs pos="100000">
-              <a:schemeClr val="phClr">
-                <a:tint val="50000"/>
-                <a:shade val="100000"/>
-                <a:satMod val="350000"/>
-              </a:schemeClr>
-            </a:gs>
-          </a:gsLst>
-          <a:lin ang="16200000" scaled="0"/>
-        </a:gradFill>
-      </a:fillStyleLst>
-      <a:lnStyleLst>
-        <a:ln cap="flat" cmpd="sng" w="9525" algn="ctr">
-          <a:solidFill>
-            <a:schemeClr val="phClr">
-              <a:shade val="95000"/>
-              <a:satMod val="105000"/>
-            </a:schemeClr>
-          </a:solidFill>
-          <a:prstDash val="solid"/>
-        </a:ln>
-        <a:ln cap="flat" cmpd="sng" w="25400" algn="ctr">
-          <a:solidFill>
-            <a:schemeClr val="phClr"/>
-          </a:solidFill>
-          <a:prstDash val="solid"/>
-        </a:ln>
-        <a:ln cap="flat" cmpd="sng" w="38100" algn="ctr">
-          <a:solidFill>
-            <a:schemeClr val="phClr"/>
-          </a:solidFill>
-          <a:prstDash val="solid"/>
-        </a:ln>
-      </a:lnStyleLst>
-      <a:effectStyleLst>
-        <a:effectStyle>
-          <a:effectLst>
-            <a:outerShdw blurRad="40000" rotWithShape="0" dir="5400000" dist="20000">
-              <a:srgbClr val="000000">
-                <a:alpha val="38000"/>
-              </a:srgbClr>
-            </a:outerShdw>
-          </a:effectLst>
-        </a:effectStyle>
-        <a:effectStyle>
-          <a:effectLst>
-            <a:outerShdw blurRad="40000" rotWithShape="0" dir="5400000" dist="23000">
-              <a:srgbClr val="000000">
-                <a:alpha val="35000"/>
-              </a:srgbClr>
-            </a:outerShdw>
-          </a:effectLst>
-        </a:effectStyle>
-        <a:effectStyle>
-          <a:effectLst>
-            <a:outerShdw blurRad="40000" rotWithShape="0" dir="5400000" dist="23000">
-              <a:srgbClr val="000000">
-                <a:alpha val="35000"/>
-              </a:srgbClr>
-            </a:outerShdw>
-          </a:effectLst>
-          <a:scene3d>
-            <a:camera prst="orthographicFront">
-              <a:rot lat="0" lon="0" rev="0"/>
-            </a:camera>
-            <a:lightRig dir="t" rig="threePt">
-              <a:rot lat="0" lon="0" rev="1200000"/>
-            </a:lightRig>
-          </a:scene3d>
-          <a:sp3d>
-            <a:bevelT h="25400" w="63500"/>
-          </a:sp3d>
-        </a:effectStyle>
-      </a:effectStyleLst>
-      <a:bgFillStyleLst>
-        <a:solidFill>
-          <a:schemeClr val="phClr"/>
-        </a:solidFill>
-        <a:gradFill rotWithShape="1">
-          <a:gsLst>
-            <a:gs pos="0">
-              <a:schemeClr val="phClr">
-                <a:tint val="40000"/>
-                <a:satMod val="350000"/>
-              </a:schemeClr>
-            </a:gs>
-            <a:gs pos="40000">
-              <a:schemeClr val="phClr">
-                <a:tint val="45000"/>
-                <a:shade val="99000"/>
-                <a:satMod val="350000"/>
-              </a:schemeClr>
-            </a:gs>
-            <a:gs pos="100000">
-              <a:schemeClr val="phClr">
-                <a:shade val="20000"/>
-                <a:satMod val="255000"/>
-              </a:schemeClr>
-            </a:gs>
-          </a:gsLst>
-          <a:path path="circle">
-            <a:fillToRect b="180000" l="50000" r="50000" t="-80000"/>
-          </a:path>
-        </a:gradFill>
-        <a:gradFill rotWithShape="1">
-          <a:gsLst>
-            <a:gs pos="0">
-              <a:schemeClr val="phClr">
-                <a:tint val="80000"/>
-                <a:satMod val="300000"/>
-              </a:schemeClr>
-            </a:gs>
-            <a:gs pos="100000">
-              <a:schemeClr val="phClr">
-                <a:shade val="30000"/>
-                <a:satMod val="200000"/>
-              </a:schemeClr>
-            </a:gs>
-          </a:gsLst>
-          <a:path path="circle">
-            <a:fillToRect b="50000" l="50000" r="50000" t="50000"/>
-          </a:path>
-        </a:gradFill>
-      </a:bgFillStyleLst>
-    </a:fmtScheme>
-  </a:themeElements>
-</a:theme>
-</file>
-
-<file path=ppt/theme/theme2.xml><?xml version="1.0" encoding="utf-8"?>
 <a:theme xmlns:a="http://schemas.openxmlformats.org/drawingml/2006/main" xmlns:r="http://schemas.openxmlformats.org/officeDocument/2006/relationships" name="Office Theme">
   <a:themeElements>
     <a:clrScheme name="Office">
@@ -7527,6 +7310,283 @@
 </a:theme>
 </file>
 
+<file path=ppt/theme/theme2.xml><?xml version="1.0" encoding="utf-8"?>
+<a:theme xmlns:a="http://schemas.openxmlformats.org/drawingml/2006/main" xmlns:r="http://schemas.openxmlformats.org/officeDocument/2006/relationships" name="khaki">
+  <a:themeElements>
+    <a:clrScheme name="Custom 349">
+      <a:dk1>
+        <a:srgbClr val="262626"/>
+      </a:dk1>
+      <a:lt1>
+        <a:srgbClr val="E6D6BD"/>
+      </a:lt1>
+      <a:dk2>
+        <a:srgbClr val="535353"/>
+      </a:dk2>
+      <a:lt2>
+        <a:srgbClr val="B4AD9E"/>
+      </a:lt2>
+      <a:accent1>
+        <a:srgbClr val="ADB48E"/>
+      </a:accent1>
+      <a:accent2>
+        <a:srgbClr val="867961"/>
+      </a:accent2>
+      <a:accent3>
+        <a:srgbClr val="CBB680"/>
+      </a:accent3>
+      <a:accent4>
+        <a:srgbClr val="78A3C0"/>
+      </a:accent4>
+      <a:accent5>
+        <a:srgbClr val="C0AE91"/>
+      </a:accent5>
+      <a:accent6>
+        <a:srgbClr val="668874"/>
+      </a:accent6>
+      <a:hlink>
+        <a:srgbClr val="4B94B3"/>
+      </a:hlink>
+      <a:folHlink>
+        <a:srgbClr val="414141"/>
+      </a:folHlink>
+    </a:clrScheme>
+    <a:fontScheme name="Office">
+      <a:majorFont>
+        <a:latin typeface="Arial"/>
+        <a:ea typeface=""/>
+        <a:cs typeface=""/>
+        <a:font script="Jpan" typeface="ＭＳ Ｐゴシック"/>
+        <a:font script="Hang" typeface="맑은 고딕"/>
+        <a:font script="Hans" typeface="宋体"/>
+        <a:font script="Hant" typeface="新細明體"/>
+        <a:font script="Arab" typeface="Times New Roman"/>
+        <a:font script="Hebr" typeface="Times New Roman"/>
+        <a:font script="Thai" typeface="Angsana New"/>
+        <a:font script="Ethi" typeface="Nyala"/>
+        <a:font script="Beng" typeface="Vrinda"/>
+        <a:font script="Gujr" typeface="Shruti"/>
+        <a:font script="Khmr" typeface="MoolBoran"/>
+        <a:font script="Knda" typeface="Tunga"/>
+        <a:font script="Guru" typeface="Raavi"/>
+        <a:font script="Cans" typeface="Euphemia"/>
+        <a:font script="Cher" typeface="Plantagenet Cherokee"/>
+        <a:font script="Yiii" typeface="Microsoft Yi Baiti"/>
+        <a:font script="Tibt" typeface="Microsoft Himalaya"/>
+        <a:font script="Thaa" typeface="MV Boli"/>
+        <a:font script="Deva" typeface="Mangal"/>
+        <a:font script="Telu" typeface="Gautami"/>
+        <a:font script="Taml" typeface="Latha"/>
+        <a:font script="Syrc" typeface="Estrangelo Edessa"/>
+        <a:font script="Orya" typeface="Kalinga"/>
+        <a:font script="Mlym" typeface="Kartika"/>
+        <a:font script="Laoo" typeface="DokChampa"/>
+        <a:font script="Sinh" typeface="Iskoola Pota"/>
+        <a:font script="Mong" typeface="Mongolian Baiti"/>
+        <a:font script="Viet" typeface="Times New Roman"/>
+        <a:font script="Uigh" typeface="Microsoft Uighur"/>
+      </a:majorFont>
+      <a:minorFont>
+        <a:latin typeface="Arial"/>
+        <a:ea typeface=""/>
+        <a:cs typeface=""/>
+        <a:font script="Jpan" typeface="ＭＳ Ｐゴシック"/>
+        <a:font script="Hang" typeface="맑은 고딕"/>
+        <a:font script="Hans" typeface="宋体"/>
+        <a:font script="Hant" typeface="新細明體"/>
+        <a:font script="Arab" typeface="Times New Roman"/>
+        <a:font script="Hebr" typeface="Times New Roman"/>
+        <a:font script="Thai" typeface="Angsana New"/>
+        <a:font script="Ethi" typeface="Nyala"/>
+        <a:font script="Beng" typeface="Vrinda"/>
+        <a:font script="Gujr" typeface="Shruti"/>
+        <a:font script="Khmr" typeface="MoolBoran"/>
+        <a:font script="Knda" typeface="Tunga"/>
+        <a:font script="Guru" typeface="Raavi"/>
+        <a:font script="Cans" typeface="Euphemia"/>
+        <a:font script="Cher" typeface="Plantagenet Cherokee"/>
+        <a:font script="Yiii" typeface="Microsoft Yi Baiti"/>
+        <a:font script="Tibt" typeface="Microsoft Himalaya"/>
+        <a:font script="Thaa" typeface="MV Boli"/>
+        <a:font script="Deva" typeface="Mangal"/>
+        <a:font script="Telu" typeface="Gautami"/>
+        <a:font script="Taml" typeface="Latha"/>
+        <a:font script="Syrc" typeface="Estrangelo Edessa"/>
+        <a:font script="Orya" typeface="Kalinga"/>
+        <a:font script="Mlym" typeface="Kartika"/>
+        <a:font script="Laoo" typeface="DokChampa"/>
+        <a:font script="Sinh" typeface="Iskoola Pota"/>
+        <a:font script="Mong" typeface="Mongolian Baiti"/>
+        <a:font script="Viet" typeface="Times New Roman"/>
+        <a:font script="Uigh" typeface="Microsoft Uighur"/>
+      </a:minorFont>
+    </a:fontScheme>
+    <a:fmtScheme name="Office">
+      <a:fillStyleLst>
+        <a:solidFill>
+          <a:schemeClr val="phClr"/>
+        </a:solidFill>
+        <a:gradFill rotWithShape="1">
+          <a:gsLst>
+            <a:gs pos="0">
+              <a:schemeClr val="phClr">
+                <a:tint val="50000"/>
+                <a:satMod val="300000"/>
+              </a:schemeClr>
+            </a:gs>
+            <a:gs pos="35000">
+              <a:schemeClr val="phClr">
+                <a:tint val="37000"/>
+                <a:satMod val="300000"/>
+              </a:schemeClr>
+            </a:gs>
+            <a:gs pos="100000">
+              <a:schemeClr val="phClr">
+                <a:tint val="15000"/>
+                <a:satMod val="350000"/>
+              </a:schemeClr>
+            </a:gs>
+          </a:gsLst>
+          <a:lin ang="16200000" scaled="1"/>
+        </a:gradFill>
+        <a:gradFill rotWithShape="1">
+          <a:gsLst>
+            <a:gs pos="0">
+              <a:schemeClr val="phClr">
+                <a:tint val="100000"/>
+                <a:shade val="100000"/>
+                <a:satMod val="130000"/>
+              </a:schemeClr>
+            </a:gs>
+            <a:gs pos="100000">
+              <a:schemeClr val="phClr">
+                <a:tint val="50000"/>
+                <a:shade val="100000"/>
+                <a:satMod val="350000"/>
+              </a:schemeClr>
+            </a:gs>
+          </a:gsLst>
+          <a:lin ang="16200000" scaled="0"/>
+        </a:gradFill>
+      </a:fillStyleLst>
+      <a:lnStyleLst>
+        <a:ln cap="flat" cmpd="sng" w="9525" algn="ctr">
+          <a:solidFill>
+            <a:schemeClr val="phClr">
+              <a:shade val="95000"/>
+              <a:satMod val="105000"/>
+            </a:schemeClr>
+          </a:solidFill>
+          <a:prstDash val="solid"/>
+        </a:ln>
+        <a:ln cap="flat" cmpd="sng" w="25400" algn="ctr">
+          <a:solidFill>
+            <a:schemeClr val="phClr"/>
+          </a:solidFill>
+          <a:prstDash val="solid"/>
+        </a:ln>
+        <a:ln cap="flat" cmpd="sng" w="38100" algn="ctr">
+          <a:solidFill>
+            <a:schemeClr val="phClr"/>
+          </a:solidFill>
+          <a:prstDash val="solid"/>
+        </a:ln>
+      </a:lnStyleLst>
+      <a:effectStyleLst>
+        <a:effectStyle>
+          <a:effectLst>
+            <a:outerShdw blurRad="40000" rotWithShape="0" dir="5400000" dist="20000">
+              <a:srgbClr val="000000">
+                <a:alpha val="38000"/>
+              </a:srgbClr>
+            </a:outerShdw>
+          </a:effectLst>
+        </a:effectStyle>
+        <a:effectStyle>
+          <a:effectLst>
+            <a:outerShdw blurRad="40000" rotWithShape="0" dir="5400000" dist="23000">
+              <a:srgbClr val="000000">
+                <a:alpha val="35000"/>
+              </a:srgbClr>
+            </a:outerShdw>
+          </a:effectLst>
+        </a:effectStyle>
+        <a:effectStyle>
+          <a:effectLst>
+            <a:outerShdw blurRad="40000" rotWithShape="0" dir="5400000" dist="23000">
+              <a:srgbClr val="000000">
+                <a:alpha val="35000"/>
+              </a:srgbClr>
+            </a:outerShdw>
+          </a:effectLst>
+          <a:scene3d>
+            <a:camera prst="orthographicFront">
+              <a:rot lat="0" lon="0" rev="0"/>
+            </a:camera>
+            <a:lightRig dir="t" rig="threePt">
+              <a:rot lat="0" lon="0" rev="1200000"/>
+            </a:lightRig>
+          </a:scene3d>
+          <a:sp3d>
+            <a:bevelT h="25400" w="63500"/>
+          </a:sp3d>
+        </a:effectStyle>
+      </a:effectStyleLst>
+      <a:bgFillStyleLst>
+        <a:solidFill>
+          <a:schemeClr val="phClr"/>
+        </a:solidFill>
+        <a:gradFill rotWithShape="1">
+          <a:gsLst>
+            <a:gs pos="0">
+              <a:schemeClr val="phClr">
+                <a:tint val="40000"/>
+                <a:satMod val="350000"/>
+              </a:schemeClr>
+            </a:gs>
+            <a:gs pos="40000">
+              <a:schemeClr val="phClr">
+                <a:tint val="45000"/>
+                <a:shade val="99000"/>
+                <a:satMod val="350000"/>
+              </a:schemeClr>
+            </a:gs>
+            <a:gs pos="100000">
+              <a:schemeClr val="phClr">
+                <a:shade val="20000"/>
+                <a:satMod val="255000"/>
+              </a:schemeClr>
+            </a:gs>
+          </a:gsLst>
+          <a:path path="circle">
+            <a:fillToRect b="180000" l="50000" r="50000" t="-80000"/>
+          </a:path>
+        </a:gradFill>
+        <a:gradFill rotWithShape="1">
+          <a:gsLst>
+            <a:gs pos="0">
+              <a:schemeClr val="phClr">
+                <a:tint val="80000"/>
+                <a:satMod val="300000"/>
+              </a:schemeClr>
+            </a:gs>
+            <a:gs pos="100000">
+              <a:schemeClr val="phClr">
+                <a:shade val="30000"/>
+                <a:satMod val="200000"/>
+              </a:schemeClr>
+            </a:gs>
+          </a:gsLst>
+          <a:path path="circle">
+            <a:fillToRect b="50000" l="50000" r="50000" t="50000"/>
+          </a:path>
+        </a:gradFill>
+      </a:bgFillStyleLst>
+    </a:fmtScheme>
+  </a:themeElements>
+</a:theme>
+</file>
+
 <file path=ppt/theme/theme3.xml><?xml version="1.0" encoding="utf-8"?>
 <a:theme xmlns:a="http://schemas.openxmlformats.org/drawingml/2006/main" xmlns:r="http://schemas.openxmlformats.org/officeDocument/2006/relationships" name="Custom Theme">
   <a:themeElements>

</xml_diff>

<commit_message>
updated presentation, fixed shuttle bug, improved user action behavior
</commit_message>
<xml_diff>
--- a/CS347 PROJECT PRESENTATION.pptx
+++ b/CS347 PROJECT PRESENTATION.pptx
@@ -5003,18 +5003,6 @@
           </a:bodyPr>
           <a:lstStyle/>
           <a:p>
-            <a:pPr lvl="0" rtl="0">
-              <a:spcBef>
-                <a:spcPts val="0"/>
-              </a:spcBef>
-              <a:buNone/>
-            </a:pPr>
-            <a:r>
-              <a:t/>
-            </a:r>
-            <a:endParaRPr sz="1400"/>
-          </a:p>
-          <a:p>
             <a:pPr indent="-317500" lvl="0" marL="457200" rtl="0">
               <a:spcBef>
                 <a:spcPts val="0"/>
@@ -5028,7 +5016,7 @@
             </a:pPr>
             <a:r>
               <a:rPr lang="en" sz="1400"/>
-              <a:t>MINOR: Cloning memberships doesn’t filter out already existing memberships so you can get duplicate memberships</a:t>
+              <a:t>Region display selector does not properly draw column names for all tabs when SHOW_ALL option is turned off.  It will only show column names for the currently selected tab</a:t>
             </a:r>
             <a:br>
               <a:rPr lang="en" sz="1400"/>
@@ -5048,84 +5036,7 @@
             </a:pPr>
             <a:r>
               <a:rPr lang="en" sz="1400"/>
-              <a:t>APEX BUGS</a:t>
-            </a:r>
-          </a:p>
-          <a:p>
-            <a:pPr indent="-317500" lvl="1" marL="914400" rtl="0">
-              <a:spcBef>
-                <a:spcPts val="0"/>
-              </a:spcBef>
-              <a:buClr>
-                <a:schemeClr val="dk2"/>
-              </a:buClr>
-              <a:buSzPct val="100000"/>
-              <a:buFont typeface="Courier New"/>
-              <a:buChar char="o"/>
-            </a:pPr>
-            <a:r>
-              <a:rPr lang="en" sz="1400"/>
-              <a:t>Committing either of the shuttles clears the selection for the other shuttle.  This appears to be an APEX issue as both of the submit processes are conditional on the specific button.  Somehow during the commit, the page refresh is commiting the other shuttles selection when it’s in the intermediate step of just loading the full list of members (before the members are moved to the right side of the shuttle)</a:t>
-            </a:r>
-            <a:br>
-              <a:rPr lang="en" sz="1400"/>
-            </a:br>
-          </a:p>
-          <a:p>
-            <a:pPr indent="-317500" lvl="1" marL="914400" rtl="0">
-              <a:spcBef>
-                <a:spcPts val="0"/>
-              </a:spcBef>
-              <a:buClr>
-                <a:schemeClr val="dk2"/>
-              </a:buClr>
-              <a:buSzPct val="100000"/>
-              <a:buFont typeface="Courier New"/>
-              <a:buChar char="o"/>
-            </a:pPr>
-            <a:r>
-              <a:rPr lang="en" sz="1400"/>
-              <a:t>Region display selector does not properly draw column names for all tabs when SHOW_ALL option is turned off.  It will only show column names for the currently selected tab</a:t>
-            </a:r>
-            <a:br>
-              <a:rPr lang="en" sz="1400"/>
-            </a:br>
-          </a:p>
-          <a:p>
-            <a:pPr indent="-317500" lvl="1" marL="914400" rtl="0">
-              <a:spcBef>
-                <a:spcPts val="0"/>
-              </a:spcBef>
-              <a:buClr>
-                <a:schemeClr val="dk2"/>
-              </a:buClr>
-              <a:buSzPct val="100000"/>
-              <a:buFont typeface="Courier New"/>
-              <a:buChar char="o"/>
-            </a:pPr>
-            <a:r>
-              <a:rPr lang="en" sz="1400"/>
               <a:t>Tree control is ‘legacy’ and doesn’t support cascading LOVs.  The only way to update it is to submit the page.</a:t>
-            </a:r>
-            <a:br>
-              <a:rPr lang="en" sz="1400"/>
-            </a:br>
-          </a:p>
-          <a:p>
-            <a:pPr indent="-317500" lvl="1" marL="914400">
-              <a:spcBef>
-                <a:spcPts val="0"/>
-              </a:spcBef>
-              <a:buClr>
-                <a:schemeClr val="dk2"/>
-              </a:buClr>
-              <a:buSzPct val="100000"/>
-              <a:buFont typeface="Courier New"/>
-              <a:buChar char="o"/>
-            </a:pPr>
-            <a:r>
-              <a:rPr lang="en" sz="1400"/>
-              <a:t>Cascading LOVs can’t reliably update the shuttle because the shuttle requires a secondary process to sort members into the right and left hand sides.</a:t>
             </a:r>
           </a:p>
         </p:txBody>
@@ -7023,283 +6934,6 @@
 </file>
 
 <file path=ppt/theme/theme1.xml><?xml version="1.0" encoding="utf-8"?>
-<a:theme xmlns:a="http://schemas.openxmlformats.org/drawingml/2006/main" xmlns:r="http://schemas.openxmlformats.org/officeDocument/2006/relationships" name="Custom Theme">
-  <a:themeElements>
-    <a:clrScheme name="Default">
-      <a:dk1>
-        <a:srgbClr val="000000"/>
-      </a:dk1>
-      <a:lt1>
-        <a:srgbClr val="FFFFFF"/>
-      </a:lt1>
-      <a:dk2>
-        <a:srgbClr val="158158"/>
-      </a:dk2>
-      <a:lt2>
-        <a:srgbClr val="F3F3F3"/>
-      </a:lt2>
-      <a:accent1>
-        <a:srgbClr val="058DC7"/>
-      </a:accent1>
-      <a:accent2>
-        <a:srgbClr val="50B432"/>
-      </a:accent2>
-      <a:accent3>
-        <a:srgbClr val="ED561B"/>
-      </a:accent3>
-      <a:accent4>
-        <a:srgbClr val="EDEF00"/>
-      </a:accent4>
-      <a:accent5>
-        <a:srgbClr val="24CBE5"/>
-      </a:accent5>
-      <a:accent6>
-        <a:srgbClr val="64E572"/>
-      </a:accent6>
-      <a:hlink>
-        <a:srgbClr val="2200CC"/>
-      </a:hlink>
-      <a:folHlink>
-        <a:srgbClr val="551A8B"/>
-      </a:folHlink>
-    </a:clrScheme>
-    <a:fontScheme name="Office">
-      <a:majorFont>
-        <a:latin typeface="Arial"/>
-        <a:ea typeface=""/>
-        <a:cs typeface=""/>
-        <a:font script="Jpan" typeface="ＭＳ Ｐゴシック"/>
-        <a:font script="Hang" typeface="맑은 고딕"/>
-        <a:font script="Hans" typeface="宋体"/>
-        <a:font script="Hant" typeface="新細明體"/>
-        <a:font script="Arab" typeface="Times New Roman"/>
-        <a:font script="Hebr" typeface="Times New Roman"/>
-        <a:font script="Thai" typeface="Angsana New"/>
-        <a:font script="Ethi" typeface="Nyala"/>
-        <a:font script="Beng" typeface="Vrinda"/>
-        <a:font script="Gujr" typeface="Shruti"/>
-        <a:font script="Khmr" typeface="MoolBoran"/>
-        <a:font script="Knda" typeface="Tunga"/>
-        <a:font script="Guru" typeface="Raavi"/>
-        <a:font script="Cans" typeface="Euphemia"/>
-        <a:font script="Cher" typeface="Plantagenet Cherokee"/>
-        <a:font script="Yiii" typeface="Microsoft Yi Baiti"/>
-        <a:font script="Tibt" typeface="Microsoft Himalaya"/>
-        <a:font script="Thaa" typeface="MV Boli"/>
-        <a:font script="Deva" typeface="Mangal"/>
-        <a:font script="Telu" typeface="Gautami"/>
-        <a:font script="Taml" typeface="Latha"/>
-        <a:font script="Syrc" typeface="Estrangelo Edessa"/>
-        <a:font script="Orya" typeface="Kalinga"/>
-        <a:font script="Mlym" typeface="Kartika"/>
-        <a:font script="Laoo" typeface="DokChampa"/>
-        <a:font script="Sinh" typeface="Iskoola Pota"/>
-        <a:font script="Mong" typeface="Mongolian Baiti"/>
-        <a:font script="Viet" typeface="Times New Roman"/>
-        <a:font script="Uigh" typeface="Microsoft Uighur"/>
-      </a:majorFont>
-      <a:minorFont>
-        <a:latin typeface="Arial"/>
-        <a:ea typeface=""/>
-        <a:cs typeface=""/>
-        <a:font script="Jpan" typeface="ＭＳ Ｐゴシック"/>
-        <a:font script="Hang" typeface="맑은 고딕"/>
-        <a:font script="Hans" typeface="宋体"/>
-        <a:font script="Hant" typeface="新細明體"/>
-        <a:font script="Arab" typeface="Times New Roman"/>
-        <a:font script="Hebr" typeface="Times New Roman"/>
-        <a:font script="Thai" typeface="Angsana New"/>
-        <a:font script="Ethi" typeface="Nyala"/>
-        <a:font script="Beng" typeface="Vrinda"/>
-        <a:font script="Gujr" typeface="Shruti"/>
-        <a:font script="Khmr" typeface="MoolBoran"/>
-        <a:font script="Knda" typeface="Tunga"/>
-        <a:font script="Guru" typeface="Raavi"/>
-        <a:font script="Cans" typeface="Euphemia"/>
-        <a:font script="Cher" typeface="Plantagenet Cherokee"/>
-        <a:font script="Yiii" typeface="Microsoft Yi Baiti"/>
-        <a:font script="Tibt" typeface="Microsoft Himalaya"/>
-        <a:font script="Thaa" typeface="MV Boli"/>
-        <a:font script="Deva" typeface="Mangal"/>
-        <a:font script="Telu" typeface="Gautami"/>
-        <a:font script="Taml" typeface="Latha"/>
-        <a:font script="Syrc" typeface="Estrangelo Edessa"/>
-        <a:font script="Orya" typeface="Kalinga"/>
-        <a:font script="Mlym" typeface="Kartika"/>
-        <a:font script="Laoo" typeface="DokChampa"/>
-        <a:font script="Sinh" typeface="Iskoola Pota"/>
-        <a:font script="Mong" typeface="Mongolian Baiti"/>
-        <a:font script="Viet" typeface="Times New Roman"/>
-        <a:font script="Uigh" typeface="Microsoft Uighur"/>
-      </a:minorFont>
-    </a:fontScheme>
-    <a:fmtScheme name="Office">
-      <a:fillStyleLst>
-        <a:solidFill>
-          <a:schemeClr val="phClr"/>
-        </a:solidFill>
-        <a:gradFill rotWithShape="1">
-          <a:gsLst>
-            <a:gs pos="0">
-              <a:schemeClr val="phClr">
-                <a:tint val="50000"/>
-                <a:satMod val="300000"/>
-              </a:schemeClr>
-            </a:gs>
-            <a:gs pos="35000">
-              <a:schemeClr val="phClr">
-                <a:tint val="37000"/>
-                <a:satMod val="300000"/>
-              </a:schemeClr>
-            </a:gs>
-            <a:gs pos="100000">
-              <a:schemeClr val="phClr">
-                <a:tint val="15000"/>
-                <a:satMod val="350000"/>
-              </a:schemeClr>
-            </a:gs>
-          </a:gsLst>
-          <a:lin ang="16200000" scaled="1"/>
-        </a:gradFill>
-        <a:gradFill rotWithShape="1">
-          <a:gsLst>
-            <a:gs pos="0">
-              <a:schemeClr val="phClr">
-                <a:tint val="100000"/>
-                <a:shade val="100000"/>
-                <a:satMod val="130000"/>
-              </a:schemeClr>
-            </a:gs>
-            <a:gs pos="100000">
-              <a:schemeClr val="phClr">
-                <a:tint val="50000"/>
-                <a:shade val="100000"/>
-                <a:satMod val="350000"/>
-              </a:schemeClr>
-            </a:gs>
-          </a:gsLst>
-          <a:lin ang="16200000" scaled="0"/>
-        </a:gradFill>
-      </a:fillStyleLst>
-      <a:lnStyleLst>
-        <a:ln cap="flat" cmpd="sng" w="9525" algn="ctr">
-          <a:solidFill>
-            <a:schemeClr val="phClr">
-              <a:shade val="95000"/>
-              <a:satMod val="105000"/>
-            </a:schemeClr>
-          </a:solidFill>
-          <a:prstDash val="solid"/>
-        </a:ln>
-        <a:ln cap="flat" cmpd="sng" w="25400" algn="ctr">
-          <a:solidFill>
-            <a:schemeClr val="phClr"/>
-          </a:solidFill>
-          <a:prstDash val="solid"/>
-        </a:ln>
-        <a:ln cap="flat" cmpd="sng" w="38100" algn="ctr">
-          <a:solidFill>
-            <a:schemeClr val="phClr"/>
-          </a:solidFill>
-          <a:prstDash val="solid"/>
-        </a:ln>
-      </a:lnStyleLst>
-      <a:effectStyleLst>
-        <a:effectStyle>
-          <a:effectLst>
-            <a:outerShdw blurRad="40000" rotWithShape="0" dir="5400000" dist="20000">
-              <a:srgbClr val="000000">
-                <a:alpha val="38000"/>
-              </a:srgbClr>
-            </a:outerShdw>
-          </a:effectLst>
-        </a:effectStyle>
-        <a:effectStyle>
-          <a:effectLst>
-            <a:outerShdw blurRad="40000" rotWithShape="0" dir="5400000" dist="23000">
-              <a:srgbClr val="000000">
-                <a:alpha val="35000"/>
-              </a:srgbClr>
-            </a:outerShdw>
-          </a:effectLst>
-        </a:effectStyle>
-        <a:effectStyle>
-          <a:effectLst>
-            <a:outerShdw blurRad="40000" rotWithShape="0" dir="5400000" dist="23000">
-              <a:srgbClr val="000000">
-                <a:alpha val="35000"/>
-              </a:srgbClr>
-            </a:outerShdw>
-          </a:effectLst>
-          <a:scene3d>
-            <a:camera prst="orthographicFront">
-              <a:rot lat="0" lon="0" rev="0"/>
-            </a:camera>
-            <a:lightRig dir="t" rig="threePt">
-              <a:rot lat="0" lon="0" rev="1200000"/>
-            </a:lightRig>
-          </a:scene3d>
-          <a:sp3d>
-            <a:bevelT h="25400" w="63500"/>
-          </a:sp3d>
-        </a:effectStyle>
-      </a:effectStyleLst>
-      <a:bgFillStyleLst>
-        <a:solidFill>
-          <a:schemeClr val="phClr"/>
-        </a:solidFill>
-        <a:gradFill rotWithShape="1">
-          <a:gsLst>
-            <a:gs pos="0">
-              <a:schemeClr val="phClr">
-                <a:tint val="40000"/>
-                <a:satMod val="350000"/>
-              </a:schemeClr>
-            </a:gs>
-            <a:gs pos="40000">
-              <a:schemeClr val="phClr">
-                <a:tint val="45000"/>
-                <a:shade val="99000"/>
-                <a:satMod val="350000"/>
-              </a:schemeClr>
-            </a:gs>
-            <a:gs pos="100000">
-              <a:schemeClr val="phClr">
-                <a:shade val="20000"/>
-                <a:satMod val="255000"/>
-              </a:schemeClr>
-            </a:gs>
-          </a:gsLst>
-          <a:path path="circle">
-            <a:fillToRect b="180000" l="50000" r="50000" t="-80000"/>
-          </a:path>
-        </a:gradFill>
-        <a:gradFill rotWithShape="1">
-          <a:gsLst>
-            <a:gs pos="0">
-              <a:schemeClr val="phClr">
-                <a:tint val="80000"/>
-                <a:satMod val="300000"/>
-              </a:schemeClr>
-            </a:gs>
-            <a:gs pos="100000">
-              <a:schemeClr val="phClr">
-                <a:shade val="30000"/>
-                <a:satMod val="200000"/>
-              </a:schemeClr>
-            </a:gs>
-          </a:gsLst>
-          <a:path path="circle">
-            <a:fillToRect b="50000" l="50000" r="50000" t="50000"/>
-          </a:path>
-        </a:gradFill>
-      </a:bgFillStyleLst>
-    </a:fmtScheme>
-  </a:themeElements>
-</a:theme>
-</file>
-
-<file path=ppt/theme/theme2.xml><?xml version="1.0" encoding="utf-8"?>
 <a:theme xmlns:a="http://schemas.openxmlformats.org/drawingml/2006/main" xmlns:r="http://schemas.openxmlformats.org/officeDocument/2006/relationships" name="khaki">
   <a:themeElements>
     <a:clrScheme name="Custom 349">
@@ -7576,7 +7210,7 @@
 </a:theme>
 </file>
 
-<file path=ppt/theme/theme3.xml><?xml version="1.0" encoding="utf-8"?>
+<file path=ppt/theme/theme2.xml><?xml version="1.0" encoding="utf-8"?>
 <a:theme xmlns:a="http://schemas.openxmlformats.org/drawingml/2006/main" xmlns:r="http://schemas.openxmlformats.org/officeDocument/2006/relationships" name="Office Theme">
   <a:themeElements>
     <a:clrScheme name="Office">
@@ -7891,4 +7525,281 @@
     </a:lnDef>
   </a:objectDefaults>
 </a:theme>
+</file>
+
+<file path=ppt/theme/theme3.xml><?xml version="1.0" encoding="utf-8"?>
+<a:theme xmlns:a="http://schemas.openxmlformats.org/drawingml/2006/main" xmlns:r="http://schemas.openxmlformats.org/officeDocument/2006/relationships" name="Custom Theme">
+  <a:themeElements>
+    <a:clrScheme name="Default">
+      <a:dk1>
+        <a:srgbClr val="000000"/>
+      </a:dk1>
+      <a:lt1>
+        <a:srgbClr val="FFFFFF"/>
+      </a:lt1>
+      <a:dk2>
+        <a:srgbClr val="158158"/>
+      </a:dk2>
+      <a:lt2>
+        <a:srgbClr val="F3F3F3"/>
+      </a:lt2>
+      <a:accent1>
+        <a:srgbClr val="058DC7"/>
+      </a:accent1>
+      <a:accent2>
+        <a:srgbClr val="50B432"/>
+      </a:accent2>
+      <a:accent3>
+        <a:srgbClr val="ED561B"/>
+      </a:accent3>
+      <a:accent4>
+        <a:srgbClr val="EDEF00"/>
+      </a:accent4>
+      <a:accent5>
+        <a:srgbClr val="24CBE5"/>
+      </a:accent5>
+      <a:accent6>
+        <a:srgbClr val="64E572"/>
+      </a:accent6>
+      <a:hlink>
+        <a:srgbClr val="2200CC"/>
+      </a:hlink>
+      <a:folHlink>
+        <a:srgbClr val="551A8B"/>
+      </a:folHlink>
+    </a:clrScheme>
+    <a:fontScheme name="Office">
+      <a:majorFont>
+        <a:latin typeface="Arial"/>
+        <a:ea typeface=""/>
+        <a:cs typeface=""/>
+        <a:font script="Jpan" typeface="ＭＳ Ｐゴシック"/>
+        <a:font script="Hang" typeface="맑은 고딕"/>
+        <a:font script="Hans" typeface="宋体"/>
+        <a:font script="Hant" typeface="新細明體"/>
+        <a:font script="Arab" typeface="Times New Roman"/>
+        <a:font script="Hebr" typeface="Times New Roman"/>
+        <a:font script="Thai" typeface="Angsana New"/>
+        <a:font script="Ethi" typeface="Nyala"/>
+        <a:font script="Beng" typeface="Vrinda"/>
+        <a:font script="Gujr" typeface="Shruti"/>
+        <a:font script="Khmr" typeface="MoolBoran"/>
+        <a:font script="Knda" typeface="Tunga"/>
+        <a:font script="Guru" typeface="Raavi"/>
+        <a:font script="Cans" typeface="Euphemia"/>
+        <a:font script="Cher" typeface="Plantagenet Cherokee"/>
+        <a:font script="Yiii" typeface="Microsoft Yi Baiti"/>
+        <a:font script="Tibt" typeface="Microsoft Himalaya"/>
+        <a:font script="Thaa" typeface="MV Boli"/>
+        <a:font script="Deva" typeface="Mangal"/>
+        <a:font script="Telu" typeface="Gautami"/>
+        <a:font script="Taml" typeface="Latha"/>
+        <a:font script="Syrc" typeface="Estrangelo Edessa"/>
+        <a:font script="Orya" typeface="Kalinga"/>
+        <a:font script="Mlym" typeface="Kartika"/>
+        <a:font script="Laoo" typeface="DokChampa"/>
+        <a:font script="Sinh" typeface="Iskoola Pota"/>
+        <a:font script="Mong" typeface="Mongolian Baiti"/>
+        <a:font script="Viet" typeface="Times New Roman"/>
+        <a:font script="Uigh" typeface="Microsoft Uighur"/>
+      </a:majorFont>
+      <a:minorFont>
+        <a:latin typeface="Arial"/>
+        <a:ea typeface=""/>
+        <a:cs typeface=""/>
+        <a:font script="Jpan" typeface="ＭＳ Ｐゴシック"/>
+        <a:font script="Hang" typeface="맑은 고딕"/>
+        <a:font script="Hans" typeface="宋体"/>
+        <a:font script="Hant" typeface="新細明體"/>
+        <a:font script="Arab" typeface="Times New Roman"/>
+        <a:font script="Hebr" typeface="Times New Roman"/>
+        <a:font script="Thai" typeface="Angsana New"/>
+        <a:font script="Ethi" typeface="Nyala"/>
+        <a:font script="Beng" typeface="Vrinda"/>
+        <a:font script="Gujr" typeface="Shruti"/>
+        <a:font script="Khmr" typeface="MoolBoran"/>
+        <a:font script="Knda" typeface="Tunga"/>
+        <a:font script="Guru" typeface="Raavi"/>
+        <a:font script="Cans" typeface="Euphemia"/>
+        <a:font script="Cher" typeface="Plantagenet Cherokee"/>
+        <a:font script="Yiii" typeface="Microsoft Yi Baiti"/>
+        <a:font script="Tibt" typeface="Microsoft Himalaya"/>
+        <a:font script="Thaa" typeface="MV Boli"/>
+        <a:font script="Deva" typeface="Mangal"/>
+        <a:font script="Telu" typeface="Gautami"/>
+        <a:font script="Taml" typeface="Latha"/>
+        <a:font script="Syrc" typeface="Estrangelo Edessa"/>
+        <a:font script="Orya" typeface="Kalinga"/>
+        <a:font script="Mlym" typeface="Kartika"/>
+        <a:font script="Laoo" typeface="DokChampa"/>
+        <a:font script="Sinh" typeface="Iskoola Pota"/>
+        <a:font script="Mong" typeface="Mongolian Baiti"/>
+        <a:font script="Viet" typeface="Times New Roman"/>
+        <a:font script="Uigh" typeface="Microsoft Uighur"/>
+      </a:minorFont>
+    </a:fontScheme>
+    <a:fmtScheme name="Office">
+      <a:fillStyleLst>
+        <a:solidFill>
+          <a:schemeClr val="phClr"/>
+        </a:solidFill>
+        <a:gradFill rotWithShape="1">
+          <a:gsLst>
+            <a:gs pos="0">
+              <a:schemeClr val="phClr">
+                <a:tint val="50000"/>
+                <a:satMod val="300000"/>
+              </a:schemeClr>
+            </a:gs>
+            <a:gs pos="35000">
+              <a:schemeClr val="phClr">
+                <a:tint val="37000"/>
+                <a:satMod val="300000"/>
+              </a:schemeClr>
+            </a:gs>
+            <a:gs pos="100000">
+              <a:schemeClr val="phClr">
+                <a:tint val="15000"/>
+                <a:satMod val="350000"/>
+              </a:schemeClr>
+            </a:gs>
+          </a:gsLst>
+          <a:lin ang="16200000" scaled="1"/>
+        </a:gradFill>
+        <a:gradFill rotWithShape="1">
+          <a:gsLst>
+            <a:gs pos="0">
+              <a:schemeClr val="phClr">
+                <a:tint val="100000"/>
+                <a:shade val="100000"/>
+                <a:satMod val="130000"/>
+              </a:schemeClr>
+            </a:gs>
+            <a:gs pos="100000">
+              <a:schemeClr val="phClr">
+                <a:tint val="50000"/>
+                <a:shade val="100000"/>
+                <a:satMod val="350000"/>
+              </a:schemeClr>
+            </a:gs>
+          </a:gsLst>
+          <a:lin ang="16200000" scaled="0"/>
+        </a:gradFill>
+      </a:fillStyleLst>
+      <a:lnStyleLst>
+        <a:ln cap="flat" cmpd="sng" w="9525" algn="ctr">
+          <a:solidFill>
+            <a:schemeClr val="phClr">
+              <a:shade val="95000"/>
+              <a:satMod val="105000"/>
+            </a:schemeClr>
+          </a:solidFill>
+          <a:prstDash val="solid"/>
+        </a:ln>
+        <a:ln cap="flat" cmpd="sng" w="25400" algn="ctr">
+          <a:solidFill>
+            <a:schemeClr val="phClr"/>
+          </a:solidFill>
+          <a:prstDash val="solid"/>
+        </a:ln>
+        <a:ln cap="flat" cmpd="sng" w="38100" algn="ctr">
+          <a:solidFill>
+            <a:schemeClr val="phClr"/>
+          </a:solidFill>
+          <a:prstDash val="solid"/>
+        </a:ln>
+      </a:lnStyleLst>
+      <a:effectStyleLst>
+        <a:effectStyle>
+          <a:effectLst>
+            <a:outerShdw blurRad="40000" rotWithShape="0" dir="5400000" dist="20000">
+              <a:srgbClr val="000000">
+                <a:alpha val="38000"/>
+              </a:srgbClr>
+            </a:outerShdw>
+          </a:effectLst>
+        </a:effectStyle>
+        <a:effectStyle>
+          <a:effectLst>
+            <a:outerShdw blurRad="40000" rotWithShape="0" dir="5400000" dist="23000">
+              <a:srgbClr val="000000">
+                <a:alpha val="35000"/>
+              </a:srgbClr>
+            </a:outerShdw>
+          </a:effectLst>
+        </a:effectStyle>
+        <a:effectStyle>
+          <a:effectLst>
+            <a:outerShdw blurRad="40000" rotWithShape="0" dir="5400000" dist="23000">
+              <a:srgbClr val="000000">
+                <a:alpha val="35000"/>
+              </a:srgbClr>
+            </a:outerShdw>
+          </a:effectLst>
+          <a:scene3d>
+            <a:camera prst="orthographicFront">
+              <a:rot lat="0" lon="0" rev="0"/>
+            </a:camera>
+            <a:lightRig dir="t" rig="threePt">
+              <a:rot lat="0" lon="0" rev="1200000"/>
+            </a:lightRig>
+          </a:scene3d>
+          <a:sp3d>
+            <a:bevelT h="25400" w="63500"/>
+          </a:sp3d>
+        </a:effectStyle>
+      </a:effectStyleLst>
+      <a:bgFillStyleLst>
+        <a:solidFill>
+          <a:schemeClr val="phClr"/>
+        </a:solidFill>
+        <a:gradFill rotWithShape="1">
+          <a:gsLst>
+            <a:gs pos="0">
+              <a:schemeClr val="phClr">
+                <a:tint val="40000"/>
+                <a:satMod val="350000"/>
+              </a:schemeClr>
+            </a:gs>
+            <a:gs pos="40000">
+              <a:schemeClr val="phClr">
+                <a:tint val="45000"/>
+                <a:shade val="99000"/>
+                <a:satMod val="350000"/>
+              </a:schemeClr>
+            </a:gs>
+            <a:gs pos="100000">
+              <a:schemeClr val="phClr">
+                <a:shade val="20000"/>
+                <a:satMod val="255000"/>
+              </a:schemeClr>
+            </a:gs>
+          </a:gsLst>
+          <a:path path="circle">
+            <a:fillToRect b="180000" l="50000" r="50000" t="-80000"/>
+          </a:path>
+        </a:gradFill>
+        <a:gradFill rotWithShape="1">
+          <a:gsLst>
+            <a:gs pos="0">
+              <a:schemeClr val="phClr">
+                <a:tint val="80000"/>
+                <a:satMod val="300000"/>
+              </a:schemeClr>
+            </a:gs>
+            <a:gs pos="100000">
+              <a:schemeClr val="phClr">
+                <a:shade val="30000"/>
+                <a:satMod val="200000"/>
+              </a:schemeClr>
+            </a:gs>
+          </a:gsLst>
+          <a:path path="circle">
+            <a:fillToRect b="50000" l="50000" r="50000" t="50000"/>
+          </a:path>
+        </a:gradFill>
+      </a:bgFillStyleLst>
+    </a:fmtScheme>
+  </a:themeElements>
+</a:theme>
 </file>
</xml_diff>